<commit_message>
Pievienotas UML diagrammas pie prezentācijas
</commit_message>
<xml_diff>
--- a/Eksāmena Darbs.pptx
+++ b/Eksāmena Darbs.pptx
@@ -5,7 +5,7 @@
     <p:sldMasterId id="2147483659" r:id="rId1"/>
   </p:sldMasterIdLst>
   <p:notesMasterIdLst>
-    <p:notesMasterId r:id="rId18"/>
+    <p:notesMasterId r:id="rId22"/>
   </p:notesMasterIdLst>
   <p:sldIdLst>
     <p:sldId id="256" r:id="rId2"/>
@@ -23,26 +23,30 @@
     <p:sldId id="268" r:id="rId14"/>
     <p:sldId id="269" r:id="rId15"/>
     <p:sldId id="270" r:id="rId16"/>
-    <p:sldId id="271" r:id="rId17"/>
+    <p:sldId id="272" r:id="rId17"/>
+    <p:sldId id="273" r:id="rId18"/>
+    <p:sldId id="274" r:id="rId19"/>
+    <p:sldId id="275" r:id="rId20"/>
+    <p:sldId id="271" r:id="rId21"/>
   </p:sldIdLst>
   <p:sldSz cx="9144000" cy="5143500" type="screen16x9"/>
   <p:notesSz cx="6858000" cy="9144000"/>
   <p:embeddedFontLst>
     <p:embeddedFont>
       <p:font typeface="Average" panose="020B0604020202020204" charset="0"/>
-      <p:regular r:id="rId19"/>
+      <p:regular r:id="rId23"/>
     </p:embeddedFont>
     <p:embeddedFont>
       <p:font typeface="Oswald" panose="00000500000000000000" pitchFamily="2" charset="0"/>
-      <p:regular r:id="rId20"/>
-      <p:bold r:id="rId21"/>
+      <p:regular r:id="rId24"/>
+      <p:bold r:id="rId25"/>
     </p:embeddedFont>
     <p:embeddedFont>
       <p:font typeface="Roboto" panose="02000000000000000000" pitchFamily="2" charset="0"/>
-      <p:regular r:id="rId22"/>
-      <p:bold r:id="rId23"/>
-      <p:italic r:id="rId24"/>
-      <p:boldItalic r:id="rId25"/>
+      <p:regular r:id="rId26"/>
+      <p:bold r:id="rId27"/>
+      <p:italic r:id="rId28"/>
+      <p:boldItalic r:id="rId29"/>
     </p:embeddedFont>
   </p:embeddedFontLst>
   <p:defaultTextStyle>
@@ -10851,7 +10855,7 @@
   <p:cSld>
     <p:spTree>
       <p:nvGrpSpPr>
-        <p:cNvPr id="1" name="Shape 149"/>
+        <p:cNvPr id="1" name=""/>
         <p:cNvGrpSpPr/>
         <p:nvPr/>
       </p:nvGrpSpPr>
@@ -10865,180 +10869,460 @@
       </p:grpSpPr>
       <p:sp>
         <p:nvSpPr>
-          <p:cNvPr id="150" name="Google Shape;150;p28"/>
-          <p:cNvSpPr txBox="1">
+          <p:cNvPr id="2" name="Title 1">
+            <a:extLst>
+              <a:ext uri="{FF2B5EF4-FFF2-40B4-BE49-F238E27FC236}">
+                <a16:creationId xmlns:a16="http://schemas.microsoft.com/office/drawing/2014/main" id="{DE1CF76E-FD87-DD55-D127-83E153D2698E}"/>
+              </a:ext>
+            </a:extLst>
+          </p:cNvPr>
+          <p:cNvSpPr>
             <a:spLocks noGrp="1"/>
           </p:cNvSpPr>
           <p:nvPr>
             <p:ph type="title"/>
           </p:nvPr>
         </p:nvSpPr>
-        <p:spPr>
-          <a:xfrm>
-            <a:off x="311700" y="445025"/>
-            <a:ext cx="8520600" cy="572700"/>
-          </a:xfrm>
-          <a:prstGeom prst="rect">
-            <a:avLst/>
-          </a:prstGeom>
-        </p:spPr>
+        <p:spPr/>
         <p:txBody>
-          <a:bodyPr spcFirstLastPara="1" wrap="square" lIns="91425" tIns="91425" rIns="91425" bIns="91425" anchor="t" anchorCtr="0">
+          <a:bodyPr>
             <a:normAutofit fontScale="90000"/>
           </a:bodyPr>
           <a:lstStyle/>
           <a:p>
-            <a:pPr marL="0" lvl="0" indent="0" algn="l" rtl="0">
-              <a:spcBef>
-                <a:spcPts val="0"/>
-              </a:spcBef>
-              <a:spcAft>
-                <a:spcPts val="0"/>
-              </a:spcAft>
-              <a:buNone/>
-            </a:pPr>
-            <a:r>
-              <a:rPr lang="en"/>
-              <a:t>Izmantoti informācijas avoti</a:t>
-            </a:r>
-            <a:endParaRPr/>
+            <a:r>
+              <a:rPr lang="lv-LV" dirty="0"/>
+              <a:t>Klašu diagramma</a:t>
+            </a:r>
+            <a:endParaRPr lang="en-GB" dirty="0"/>
           </a:p>
         </p:txBody>
       </p:sp>
       <p:sp>
         <p:nvSpPr>
-          <p:cNvPr id="151" name="Google Shape;151;p28"/>
-          <p:cNvSpPr txBox="1">
+          <p:cNvPr id="3" name="Text Placeholder 2">
+            <a:extLst>
+              <a:ext uri="{FF2B5EF4-FFF2-40B4-BE49-F238E27FC236}">
+                <a16:creationId xmlns:a16="http://schemas.microsoft.com/office/drawing/2014/main" id="{8B5628C3-3CF8-E176-BF19-DD110BF8C5D7}"/>
+              </a:ext>
+            </a:extLst>
+          </p:cNvPr>
+          <p:cNvSpPr>
             <a:spLocks noGrp="1"/>
           </p:cNvSpPr>
           <p:nvPr>
             <p:ph type="body" idx="1"/>
           </p:nvPr>
         </p:nvSpPr>
+        <p:spPr/>
+        <p:txBody>
+          <a:bodyPr>
+            <a:normAutofit fontScale="92500"/>
+          </a:bodyPr>
+          <a:lstStyle/>
+          <a:p>
+            <a:pPr marL="114300" indent="0">
+              <a:buNone/>
+            </a:pPr>
+            <a:r>
+              <a:rPr lang="lv-LV" dirty="0"/>
+              <a:t>Klasei ir trīs privāti mainīgie:</a:t>
+            </a:r>
+          </a:p>
+          <a:p>
+            <a:r>
+              <a:rPr lang="lv-LV" dirty="0"/>
+              <a:t>"jautajumi" ir virkņu masīvs, kurā glabājas visi jautājumi.</a:t>
+            </a:r>
+          </a:p>
+          <a:p>
+            <a:r>
+              <a:rPr lang="lv-LV" dirty="0"/>
+              <a:t>"izveles" ir 2D virkņu masīvs, kurā tiek saglabātas atbilžu izvēles katram jautājumam.</a:t>
+            </a:r>
+          </a:p>
+          <a:p>
+            <a:r>
+              <a:rPr lang="lv-LV" dirty="0"/>
+              <a:t>"pareizasAtbildes" ir 2D rakstzīmju masīvs, kurā tiek saglabātas pareizās atbildes uz katru jautājumu.</a:t>
+            </a:r>
+          </a:p>
+          <a:p>
+            <a:endParaRPr lang="lv-LV" dirty="0"/>
+          </a:p>
+          <a:p>
+            <a:pPr marL="114300" indent="0">
+              <a:buNone/>
+            </a:pPr>
+            <a:r>
+              <a:rPr lang="lv-LV" dirty="0"/>
+              <a:t>Klasei ir trīs publiskās metodes:</a:t>
+            </a:r>
+          </a:p>
+          <a:p>
+            <a:r>
+              <a:rPr lang="lv-LV" dirty="0"/>
+              <a:t>"saktSpeli()" sāk spēli.</a:t>
+            </a:r>
+          </a:p>
+          <a:p>
+            <a:r>
+              <a:rPr lang="lv-LV" dirty="0"/>
+              <a:t>"paraditIzveles(int)" parāda atbilžu variantus konkrētam jautājumam.</a:t>
+            </a:r>
+          </a:p>
+          <a:p>
+            <a:r>
+              <a:rPr lang="lv-LV" dirty="0"/>
+              <a:t>"vaiAtbildePareiza(int, String)" pārbauda, ​​vai lietotāja atbilde sakrīt ar pareizo atbildi.</a:t>
+            </a:r>
+            <a:endParaRPr lang="en-GB" dirty="0"/>
+          </a:p>
+        </p:txBody>
+      </p:sp>
+    </p:spTree>
+    <p:extLst>
+      <p:ext uri="{BB962C8B-B14F-4D97-AF65-F5344CB8AC3E}">
+        <p14:creationId xmlns:p14="http://schemas.microsoft.com/office/powerpoint/2010/main" val="4041491762"/>
+      </p:ext>
+    </p:extLst>
+  </p:cSld>
+  <p:clrMapOvr>
+    <a:masterClrMapping/>
+  </p:clrMapOvr>
+</p:sld>
+</file>
+
+<file path=ppt/slides/slide17.xml><?xml version="1.0" encoding="utf-8"?>
+<p:sld xmlns:a="http://schemas.openxmlformats.org/drawingml/2006/main" xmlns:r="http://schemas.openxmlformats.org/officeDocument/2006/relationships" xmlns:p="http://schemas.openxmlformats.org/presentationml/2006/main">
+  <p:cSld>
+    <p:spTree>
+      <p:nvGrpSpPr>
+        <p:cNvPr id="1" name=""/>
+        <p:cNvGrpSpPr/>
+        <p:nvPr/>
+      </p:nvGrpSpPr>
+      <p:grpSpPr>
+        <a:xfrm>
+          <a:off x="0" y="0"/>
+          <a:ext cx="0" cy="0"/>
+          <a:chOff x="0" y="0"/>
+          <a:chExt cx="0" cy="0"/>
+        </a:xfrm>
+      </p:grpSpPr>
+      <p:sp>
+        <p:nvSpPr>
+          <p:cNvPr id="2" name="Title 1">
+            <a:extLst>
+              <a:ext uri="{FF2B5EF4-FFF2-40B4-BE49-F238E27FC236}">
+                <a16:creationId xmlns:a16="http://schemas.microsoft.com/office/drawing/2014/main" id="{07174738-0787-0C2C-2D10-FF8434BCC87D}"/>
+              </a:ext>
+            </a:extLst>
+          </p:cNvPr>
+          <p:cNvSpPr>
+            <a:spLocks noGrp="1"/>
+          </p:cNvSpPr>
+          <p:nvPr>
+            <p:ph type="title"/>
+          </p:nvPr>
+        </p:nvSpPr>
+        <p:spPr/>
+        <p:txBody>
+          <a:bodyPr>
+            <a:normAutofit fontScale="90000"/>
+          </a:bodyPr>
+          <a:lstStyle/>
+          <a:p>
+            <a:r>
+              <a:rPr lang="lv-LV" dirty="0"/>
+              <a:t>Klašu diagramma</a:t>
+            </a:r>
+            <a:endParaRPr lang="en-GB" dirty="0"/>
+          </a:p>
+        </p:txBody>
+      </p:sp>
+      <p:sp>
+        <p:nvSpPr>
+          <p:cNvPr id="3" name="Text Placeholder 2">
+            <a:extLst>
+              <a:ext uri="{FF2B5EF4-FFF2-40B4-BE49-F238E27FC236}">
+                <a16:creationId xmlns:a16="http://schemas.microsoft.com/office/drawing/2014/main" id="{30DE9415-3250-F5B7-4EB5-BF88C5995009}"/>
+              </a:ext>
+            </a:extLst>
+          </p:cNvPr>
+          <p:cNvSpPr>
+            <a:spLocks noGrp="1"/>
+          </p:cNvSpPr>
+          <p:nvPr>
+            <p:ph type="body" idx="1"/>
+          </p:nvPr>
+        </p:nvSpPr>
+        <p:spPr/>
+        <p:txBody>
+          <a:bodyPr/>
+          <a:lstStyle/>
+          <a:p>
+            <a:endParaRPr lang="en-GB" dirty="0"/>
+          </a:p>
+        </p:txBody>
+      </p:sp>
+      <p:pic>
+        <p:nvPicPr>
+          <p:cNvPr id="7" name="Picture 6">
+            <a:extLst>
+              <a:ext uri="{FF2B5EF4-FFF2-40B4-BE49-F238E27FC236}">
+                <a16:creationId xmlns:a16="http://schemas.microsoft.com/office/drawing/2014/main" id="{264909CD-1712-6833-9D81-C0E8B7572A30}"/>
+              </a:ext>
+            </a:extLst>
+          </p:cNvPr>
+          <p:cNvPicPr>
+            <a:picLocks noChangeAspect="1"/>
+          </p:cNvPicPr>
+          <p:nvPr/>
+        </p:nvPicPr>
+        <p:blipFill>
+          <a:blip r:embed="rId2"/>
+          <a:stretch>
+            <a:fillRect/>
+          </a:stretch>
+        </p:blipFill>
         <p:spPr>
           <a:xfrm>
-            <a:off x="311700" y="1152475"/>
-            <a:ext cx="8520600" cy="3416400"/>
+            <a:off x="155850" y="1017725"/>
+            <a:ext cx="8832300" cy="3961847"/>
           </a:xfrm>
           <a:prstGeom prst="rect">
             <a:avLst/>
           </a:prstGeom>
         </p:spPr>
+      </p:pic>
+    </p:spTree>
+    <p:extLst>
+      <p:ext uri="{BB962C8B-B14F-4D97-AF65-F5344CB8AC3E}">
+        <p14:creationId xmlns:p14="http://schemas.microsoft.com/office/powerpoint/2010/main" val="1355517816"/>
+      </p:ext>
+    </p:extLst>
+  </p:cSld>
+  <p:clrMapOvr>
+    <a:masterClrMapping/>
+  </p:clrMapOvr>
+</p:sld>
+</file>
+
+<file path=ppt/slides/slide18.xml><?xml version="1.0" encoding="utf-8"?>
+<p:sld xmlns:a="http://schemas.openxmlformats.org/drawingml/2006/main" xmlns:r="http://schemas.openxmlformats.org/officeDocument/2006/relationships" xmlns:p="http://schemas.openxmlformats.org/presentationml/2006/main">
+  <p:cSld>
+    <p:spTree>
+      <p:nvGrpSpPr>
+        <p:cNvPr id="1" name=""/>
+        <p:cNvGrpSpPr/>
+        <p:nvPr/>
+      </p:nvGrpSpPr>
+      <p:grpSpPr>
+        <a:xfrm>
+          <a:off x="0" y="0"/>
+          <a:ext cx="0" cy="0"/>
+          <a:chOff x="0" y="0"/>
+          <a:chExt cx="0" cy="0"/>
+        </a:xfrm>
+      </p:grpSpPr>
+      <p:sp>
+        <p:nvSpPr>
+          <p:cNvPr id="2" name="Title 1">
+            <a:extLst>
+              <a:ext uri="{FF2B5EF4-FFF2-40B4-BE49-F238E27FC236}">
+                <a16:creationId xmlns:a16="http://schemas.microsoft.com/office/drawing/2014/main" id="{68E94676-9481-3D25-D6C5-7D8A6B8368EF}"/>
+              </a:ext>
+            </a:extLst>
+          </p:cNvPr>
+          <p:cNvSpPr>
+            <a:spLocks noGrp="1"/>
+          </p:cNvSpPr>
+          <p:nvPr>
+            <p:ph type="title"/>
+          </p:nvPr>
+        </p:nvSpPr>
+        <p:spPr/>
         <p:txBody>
-          <a:bodyPr spcFirstLastPara="1" wrap="square" lIns="91425" tIns="91425" rIns="91425" bIns="91425" anchor="t" anchorCtr="0">
-            <a:normAutofit/>
+          <a:bodyPr>
+            <a:normAutofit fontScale="90000"/>
           </a:bodyPr>
           <a:lstStyle/>
           <a:p>
-            <a:pPr marL="0" lvl="0" indent="0" algn="l" rtl="0">
-              <a:spcBef>
-                <a:spcPts val="0"/>
-              </a:spcBef>
-              <a:spcAft>
-                <a:spcPts val="0"/>
-              </a:spcAft>
-              <a:buNone/>
-            </a:pPr>
-            <a:r>
-              <a:rPr lang="en" u="sng" dirty="0">
-                <a:solidFill>
-                  <a:schemeClr val="hlink"/>
-                </a:solidFill>
-                <a:hlinkClick r:id="rId3"/>
-              </a:rPr>
-              <a:t>www.w3schools.com</a:t>
-            </a:r>
-            <a:endParaRPr dirty="0"/>
-          </a:p>
-          <a:p>
-            <a:pPr marL="0" lvl="0" indent="0" algn="l" rtl="0">
-              <a:spcBef>
-                <a:spcPts val="1200"/>
-              </a:spcBef>
-              <a:spcAft>
-                <a:spcPts val="0"/>
-              </a:spcAft>
-              <a:buNone/>
-            </a:pPr>
-            <a:r>
-              <a:rPr lang="en" u="sng" dirty="0">
-                <a:solidFill>
-                  <a:schemeClr val="hlink"/>
-                </a:solidFill>
-                <a:hlinkClick r:id="rId4"/>
-              </a:rPr>
-              <a:t>www.geeksforgeeks.org</a:t>
-            </a:r>
-            <a:endParaRPr dirty="0"/>
-          </a:p>
-          <a:p>
-            <a:pPr marL="0" lvl="0" indent="0" algn="l" rtl="0">
-              <a:spcBef>
-                <a:spcPts val="1200"/>
-              </a:spcBef>
-              <a:spcAft>
-                <a:spcPts val="0"/>
-              </a:spcAft>
-              <a:buNone/>
-            </a:pPr>
-            <a:r>
-              <a:rPr lang="en" u="sng" dirty="0">
-                <a:solidFill>
-                  <a:schemeClr val="hlink"/>
-                </a:solidFill>
-                <a:latin typeface="Roboto"/>
-                <a:ea typeface="Roboto"/>
-                <a:cs typeface="Roboto"/>
-                <a:sym typeface="Roboto"/>
-                <a:hlinkClick r:id="rId5"/>
-              </a:rPr>
-              <a:t>www.programiz.com</a:t>
-            </a:r>
-            <a:endParaRPr dirty="0">
-              <a:solidFill>
-                <a:srgbClr val="9AA0A6"/>
-              </a:solidFill>
-              <a:latin typeface="Roboto"/>
-              <a:ea typeface="Roboto"/>
-              <a:cs typeface="Roboto"/>
-              <a:sym typeface="Roboto"/>
-            </a:endParaRPr>
-          </a:p>
-          <a:p>
-            <a:pPr marL="0" lvl="0" indent="0" algn="l" rtl="0">
-              <a:spcBef>
-                <a:spcPts val="1200"/>
-              </a:spcBef>
-              <a:spcAft>
-                <a:spcPts val="0"/>
-              </a:spcAft>
-              <a:buNone/>
-            </a:pPr>
-            <a:endParaRPr sz="1000" dirty="0">
-              <a:solidFill>
-                <a:srgbClr val="9AA0A6"/>
-              </a:solidFill>
-              <a:latin typeface="Roboto"/>
-              <a:ea typeface="Roboto"/>
-              <a:cs typeface="Roboto"/>
-              <a:sym typeface="Roboto"/>
-            </a:endParaRPr>
-          </a:p>
-          <a:p>
-            <a:pPr marL="0" lvl="0" indent="0" algn="l" rtl="0">
-              <a:spcBef>
-                <a:spcPts val="1200"/>
-              </a:spcBef>
-              <a:spcAft>
-                <a:spcPts val="1200"/>
-              </a:spcAft>
-              <a:buNone/>
-            </a:pPr>
-            <a:endParaRPr dirty="0"/>
+            <a:r>
+              <a:rPr lang="lv-LV" dirty="0"/>
+              <a:t>Aktivitāšu diagramma</a:t>
+            </a:r>
+            <a:endParaRPr lang="en-GB" dirty="0"/>
+          </a:p>
+        </p:txBody>
+      </p:sp>
+      <p:sp>
+        <p:nvSpPr>
+          <p:cNvPr id="3" name="Text Placeholder 2">
+            <a:extLst>
+              <a:ext uri="{FF2B5EF4-FFF2-40B4-BE49-F238E27FC236}">
+                <a16:creationId xmlns:a16="http://schemas.microsoft.com/office/drawing/2014/main" id="{5A44C3F0-DEBE-C41F-3756-4387F09FEEB1}"/>
+              </a:ext>
+            </a:extLst>
+          </p:cNvPr>
+          <p:cNvSpPr>
+            <a:spLocks noGrp="1"/>
+          </p:cNvSpPr>
+          <p:nvPr>
+            <p:ph type="body" idx="1"/>
+          </p:nvPr>
+        </p:nvSpPr>
+        <p:spPr/>
+        <p:txBody>
+          <a:bodyPr/>
+          <a:lstStyle/>
+          <a:p>
+            <a:pPr marL="114300" indent="0">
+              <a:buNone/>
+            </a:pPr>
+            <a:r>
+              <a:rPr lang="lv-LV" dirty="0"/>
+              <a:t>Aktivitāšu diagrammā pārbauda, ja atbild uz jautājumu ar pirmo mēģinājumu, ja ir ar pirmo mēģinājumu, un pareizi atbildēts, tad pieskaita punktu un parāda nākamo jautājumu.</a:t>
+            </a:r>
+          </a:p>
+          <a:p>
+            <a:pPr marL="114300" indent="0">
+              <a:buNone/>
+            </a:pPr>
+            <a:br>
+              <a:rPr lang="lv-LV" dirty="0"/>
+            </a:br>
+            <a:r>
+              <a:rPr lang="lv-LV" dirty="0"/>
+              <a:t>Kad visi jautājumi ir atbildēti, tad programma aizveras.</a:t>
+            </a:r>
+            <a:endParaRPr lang="en-GB" dirty="0"/>
           </a:p>
         </p:txBody>
       </p:sp>
     </p:spTree>
+    <p:extLst>
+      <p:ext uri="{BB962C8B-B14F-4D97-AF65-F5344CB8AC3E}">
+        <p14:creationId xmlns:p14="http://schemas.microsoft.com/office/powerpoint/2010/main" val="3421029407"/>
+      </p:ext>
+    </p:extLst>
+  </p:cSld>
+  <p:clrMapOvr>
+    <a:masterClrMapping/>
+  </p:clrMapOvr>
+</p:sld>
+</file>
+
+<file path=ppt/slides/slide19.xml><?xml version="1.0" encoding="utf-8"?>
+<p:sld xmlns:a="http://schemas.openxmlformats.org/drawingml/2006/main" xmlns:r="http://schemas.openxmlformats.org/officeDocument/2006/relationships" xmlns:p="http://schemas.openxmlformats.org/presentationml/2006/main">
+  <p:cSld>
+    <p:spTree>
+      <p:nvGrpSpPr>
+        <p:cNvPr id="1" name=""/>
+        <p:cNvGrpSpPr/>
+        <p:nvPr/>
+      </p:nvGrpSpPr>
+      <p:grpSpPr>
+        <a:xfrm>
+          <a:off x="0" y="0"/>
+          <a:ext cx="0" cy="0"/>
+          <a:chOff x="0" y="0"/>
+          <a:chExt cx="0" cy="0"/>
+        </a:xfrm>
+      </p:grpSpPr>
+      <p:sp>
+        <p:nvSpPr>
+          <p:cNvPr id="2" name="Title 1">
+            <a:extLst>
+              <a:ext uri="{FF2B5EF4-FFF2-40B4-BE49-F238E27FC236}">
+                <a16:creationId xmlns:a16="http://schemas.microsoft.com/office/drawing/2014/main" id="{C9FCD934-395F-2899-92D9-B6CD67F1B1C6}"/>
+              </a:ext>
+            </a:extLst>
+          </p:cNvPr>
+          <p:cNvSpPr>
+            <a:spLocks noGrp="1"/>
+          </p:cNvSpPr>
+          <p:nvPr>
+            <p:ph type="title"/>
+          </p:nvPr>
+        </p:nvSpPr>
+        <p:spPr/>
+        <p:txBody>
+          <a:bodyPr>
+            <a:normAutofit fontScale="90000"/>
+          </a:bodyPr>
+          <a:lstStyle/>
+          <a:p>
+            <a:r>
+              <a:rPr lang="lv-LV" dirty="0"/>
+              <a:t>Aktivitāšu diagramma</a:t>
+            </a:r>
+            <a:endParaRPr lang="en-GB" dirty="0"/>
+          </a:p>
+        </p:txBody>
+      </p:sp>
+      <p:sp>
+        <p:nvSpPr>
+          <p:cNvPr id="3" name="Text Placeholder 2">
+            <a:extLst>
+              <a:ext uri="{FF2B5EF4-FFF2-40B4-BE49-F238E27FC236}">
+                <a16:creationId xmlns:a16="http://schemas.microsoft.com/office/drawing/2014/main" id="{DDD6B269-8288-7C64-1924-29C42C02D3A0}"/>
+              </a:ext>
+            </a:extLst>
+          </p:cNvPr>
+          <p:cNvSpPr>
+            <a:spLocks noGrp="1"/>
+          </p:cNvSpPr>
+          <p:nvPr>
+            <p:ph type="body" idx="1"/>
+          </p:nvPr>
+        </p:nvSpPr>
+        <p:spPr/>
+        <p:txBody>
+          <a:bodyPr/>
+          <a:lstStyle/>
+          <a:p>
+            <a:endParaRPr lang="en-GB" dirty="0"/>
+          </a:p>
+        </p:txBody>
+      </p:sp>
+      <p:pic>
+        <p:nvPicPr>
+          <p:cNvPr id="4" name="Picture 3">
+            <a:extLst>
+              <a:ext uri="{FF2B5EF4-FFF2-40B4-BE49-F238E27FC236}">
+                <a16:creationId xmlns:a16="http://schemas.microsoft.com/office/drawing/2014/main" id="{ED4B076E-2E91-53CA-BEC1-07738ABF0CFE}"/>
+              </a:ext>
+            </a:extLst>
+          </p:cNvPr>
+          <p:cNvPicPr>
+            <a:picLocks noChangeAspect="1"/>
+          </p:cNvPicPr>
+          <p:nvPr/>
+        </p:nvPicPr>
+        <p:blipFill>
+          <a:blip r:embed="rId2"/>
+          <a:stretch>
+            <a:fillRect/>
+          </a:stretch>
+        </p:blipFill>
+        <p:spPr>
+          <a:xfrm>
+            <a:off x="3453206" y="146355"/>
+            <a:ext cx="5496204" cy="4793943"/>
+          </a:xfrm>
+          <a:prstGeom prst="rect">
+            <a:avLst/>
+          </a:prstGeom>
+        </p:spPr>
+      </p:pic>
+    </p:spTree>
+    <p:extLst>
+      <p:ext uri="{BB962C8B-B14F-4D97-AF65-F5344CB8AC3E}">
+        <p14:creationId xmlns:p14="http://schemas.microsoft.com/office/powerpoint/2010/main" val="3099387523"/>
+      </p:ext>
+    </p:extLst>
   </p:cSld>
   <p:clrMapOvr>
     <a:masterClrMapping/>
@@ -11207,6 +11491,206 @@
           </a:ln>
         </p:spPr>
       </p:pic>
+    </p:spTree>
+  </p:cSld>
+  <p:clrMapOvr>
+    <a:masterClrMapping/>
+  </p:clrMapOvr>
+</p:sld>
+</file>
+
+<file path=ppt/slides/slide20.xml><?xml version="1.0" encoding="utf-8"?>
+<p:sld xmlns:a="http://schemas.openxmlformats.org/drawingml/2006/main" xmlns:r="http://schemas.openxmlformats.org/officeDocument/2006/relationships" xmlns:p="http://schemas.openxmlformats.org/presentationml/2006/main">
+  <p:cSld>
+    <p:spTree>
+      <p:nvGrpSpPr>
+        <p:cNvPr id="1" name="Shape 149"/>
+        <p:cNvGrpSpPr/>
+        <p:nvPr/>
+      </p:nvGrpSpPr>
+      <p:grpSpPr>
+        <a:xfrm>
+          <a:off x="0" y="0"/>
+          <a:ext cx="0" cy="0"/>
+          <a:chOff x="0" y="0"/>
+          <a:chExt cx="0" cy="0"/>
+        </a:xfrm>
+      </p:grpSpPr>
+      <p:sp>
+        <p:nvSpPr>
+          <p:cNvPr id="150" name="Google Shape;150;p28"/>
+          <p:cNvSpPr txBox="1">
+            <a:spLocks noGrp="1"/>
+          </p:cNvSpPr>
+          <p:nvPr>
+            <p:ph type="title"/>
+          </p:nvPr>
+        </p:nvSpPr>
+        <p:spPr>
+          <a:xfrm>
+            <a:off x="311700" y="445025"/>
+            <a:ext cx="8520600" cy="572700"/>
+          </a:xfrm>
+          <a:prstGeom prst="rect">
+            <a:avLst/>
+          </a:prstGeom>
+        </p:spPr>
+        <p:txBody>
+          <a:bodyPr spcFirstLastPara="1" wrap="square" lIns="91425" tIns="91425" rIns="91425" bIns="91425" anchor="t" anchorCtr="0">
+            <a:normAutofit fontScale="90000"/>
+          </a:bodyPr>
+          <a:lstStyle/>
+          <a:p>
+            <a:pPr marL="0" lvl="0" indent="0" algn="l" rtl="0">
+              <a:spcBef>
+                <a:spcPts val="0"/>
+              </a:spcBef>
+              <a:spcAft>
+                <a:spcPts val="0"/>
+              </a:spcAft>
+              <a:buNone/>
+            </a:pPr>
+            <a:r>
+              <a:rPr lang="en"/>
+              <a:t>Izmantoti informācijas avoti</a:t>
+            </a:r>
+            <a:endParaRPr/>
+          </a:p>
+        </p:txBody>
+      </p:sp>
+      <p:sp>
+        <p:nvSpPr>
+          <p:cNvPr id="151" name="Google Shape;151;p28"/>
+          <p:cNvSpPr txBox="1">
+            <a:spLocks noGrp="1"/>
+          </p:cNvSpPr>
+          <p:nvPr>
+            <p:ph type="body" idx="1"/>
+          </p:nvPr>
+        </p:nvSpPr>
+        <p:spPr>
+          <a:xfrm>
+            <a:off x="311700" y="1152475"/>
+            <a:ext cx="8520600" cy="3416400"/>
+          </a:xfrm>
+          <a:prstGeom prst="rect">
+            <a:avLst/>
+          </a:prstGeom>
+        </p:spPr>
+        <p:txBody>
+          <a:bodyPr spcFirstLastPara="1" wrap="square" lIns="91425" tIns="91425" rIns="91425" bIns="91425" anchor="t" anchorCtr="0">
+            <a:normAutofit/>
+          </a:bodyPr>
+          <a:lstStyle/>
+          <a:p>
+            <a:pPr marL="0" lvl="0" indent="0" algn="l" rtl="0">
+              <a:spcBef>
+                <a:spcPts val="0"/>
+              </a:spcBef>
+              <a:spcAft>
+                <a:spcPts val="0"/>
+              </a:spcAft>
+              <a:buNone/>
+            </a:pPr>
+            <a:r>
+              <a:rPr lang="en" u="sng" dirty="0">
+                <a:solidFill>
+                  <a:schemeClr val="hlink"/>
+                </a:solidFill>
+                <a:hlinkClick r:id="rId3"/>
+              </a:rPr>
+              <a:t>www.w3schools.com</a:t>
+            </a:r>
+            <a:endParaRPr dirty="0"/>
+          </a:p>
+          <a:p>
+            <a:pPr marL="0" lvl="0" indent="0" algn="l" rtl="0">
+              <a:spcBef>
+                <a:spcPts val="1200"/>
+              </a:spcBef>
+              <a:spcAft>
+                <a:spcPts val="0"/>
+              </a:spcAft>
+              <a:buNone/>
+            </a:pPr>
+            <a:r>
+              <a:rPr lang="en" u="sng" dirty="0">
+                <a:solidFill>
+                  <a:schemeClr val="hlink"/>
+                </a:solidFill>
+                <a:hlinkClick r:id="rId4"/>
+              </a:rPr>
+              <a:t>www.geeksforgeeks.org</a:t>
+            </a:r>
+            <a:endParaRPr dirty="0"/>
+          </a:p>
+          <a:p>
+            <a:pPr marL="0" lvl="0" indent="0" algn="l" rtl="0">
+              <a:spcBef>
+                <a:spcPts val="1200"/>
+              </a:spcBef>
+              <a:spcAft>
+                <a:spcPts val="0"/>
+              </a:spcAft>
+              <a:buNone/>
+            </a:pPr>
+            <a:r>
+              <a:rPr lang="en" u="sng" dirty="0">
+                <a:solidFill>
+                  <a:schemeClr val="hlink"/>
+                </a:solidFill>
+                <a:latin typeface="Roboto"/>
+                <a:ea typeface="Roboto"/>
+                <a:cs typeface="Roboto"/>
+                <a:sym typeface="Roboto"/>
+                <a:hlinkClick r:id="rId5"/>
+              </a:rPr>
+              <a:t>www.programiz.com</a:t>
+            </a:r>
+            <a:endParaRPr dirty="0">
+              <a:solidFill>
+                <a:srgbClr val="9AA0A6"/>
+              </a:solidFill>
+              <a:latin typeface="Roboto"/>
+              <a:ea typeface="Roboto"/>
+              <a:cs typeface="Roboto"/>
+              <a:sym typeface="Roboto"/>
+            </a:endParaRPr>
+          </a:p>
+          <a:p>
+            <a:pPr marL="0" lvl="0" indent="0" algn="l" rtl="0">
+              <a:spcBef>
+                <a:spcPts val="1200"/>
+              </a:spcBef>
+              <a:spcAft>
+                <a:spcPts val="0"/>
+              </a:spcAft>
+              <a:buNone/>
+            </a:pPr>
+            <a:endParaRPr sz="1000" dirty="0">
+              <a:solidFill>
+                <a:srgbClr val="9AA0A6"/>
+              </a:solidFill>
+              <a:latin typeface="Roboto"/>
+              <a:ea typeface="Roboto"/>
+              <a:cs typeface="Roboto"/>
+              <a:sym typeface="Roboto"/>
+            </a:endParaRPr>
+          </a:p>
+          <a:p>
+            <a:pPr marL="0" lvl="0" indent="0" algn="l" rtl="0">
+              <a:spcBef>
+                <a:spcPts val="1200"/>
+              </a:spcBef>
+              <a:spcAft>
+                <a:spcPts val="1200"/>
+              </a:spcAft>
+              <a:buNone/>
+            </a:pPr>
+            <a:endParaRPr dirty="0"/>
+          </a:p>
+        </p:txBody>
+      </p:sp>
     </p:spTree>
   </p:cSld>
   <p:clrMapOvr>

</xml_diff>